<commit_message>
Added CC BY license to ppt.
</commit_message>
<xml_diff>
--- a/Computer Science and Robotics using SBCs.pptx
+++ b/Computer Science and Robotics using SBCs.pptx
@@ -259,7 +259,7 @@
           <a:p>
             <a:fld id="{0E3B38EC-A174-40F2-9DE8-EFFEFF7EEB92}" type="datetimeFigureOut">
               <a:rPr lang="en-US" smtClean="0"/>
-              <a:t>4/19/2018</a:t>
+              <a:t>4/22/2018</a:t>
             </a:fld>
             <a:endParaRPr lang="en-US"/>
           </a:p>
@@ -3716,6 +3716,42 @@
               </a14:hiddenEffects>
             </a:ext>
           </a:extLst>
+        </p:spPr>
+      </p:pic>
+      <p:pic>
+        <p:nvPicPr>
+          <p:cNvPr id="10" name="Picture 9">
+            <a:extLst>
+              <a:ext uri="{FF2B5EF4-FFF2-40B4-BE49-F238E27FC236}">
+                <a16:creationId xmlns:a16="http://schemas.microsoft.com/office/drawing/2014/main" id="{053A41C1-DEFA-45B4-A525-EEF2B075E01D}"/>
+              </a:ext>
+            </a:extLst>
+          </p:cNvPr>
+          <p:cNvPicPr>
+            <a:picLocks noChangeAspect="1"/>
+          </p:cNvPicPr>
+          <p:nvPr userDrawn="1"/>
+        </p:nvPicPr>
+        <p:blipFill>
+          <a:blip r:embed="rId17">
+            <a:extLst>
+              <a:ext uri="{28A0092B-C50C-407E-A947-70E740481C1C}">
+                <a14:useLocalDpi xmlns:a14="http://schemas.microsoft.com/office/drawing/2010/main" val="0"/>
+              </a:ext>
+            </a:extLst>
+          </a:blip>
+          <a:stretch>
+            <a:fillRect/>
+          </a:stretch>
+        </p:blipFill>
+        <p:spPr>
+          <a:xfrm>
+            <a:off x="6580467" y="6356350"/>
+            <a:ext cx="838200" cy="295275"/>
+          </a:xfrm>
+          <a:prstGeom prst="rect">
+            <a:avLst/>
+          </a:prstGeom>
         </p:spPr>
       </p:pic>
     </p:spTree>

</xml_diff>